<commit_message>
Fix  correct github address in powerpoint
</commit_message>
<xml_diff>
--- a/DotNetMeetup39.pptx
+++ b/DotNetMeetup39.pptx
@@ -7791,17 +7791,7 @@
                 <a:latin typeface="Franklin Gothic Heavy" panose="020B0903020102020204" pitchFamily="34" charset="0"/>
                 <a:hlinkClick r:id="rId5"/>
               </a:rPr>
-              <a:t>https://</a:t>
-            </a:r>
-            <a:r>
-              <a:rPr lang="en-US" sz="2000" smtClean="0">
-                <a:solidFill>
-                  <a:schemeClr val="bg1"/>
-                </a:solidFill>
-                <a:latin typeface="Franklin Gothic Heavy" panose="020B0903020102020204" pitchFamily="34" charset="0"/>
-                <a:hlinkClick r:id="rId5"/>
-              </a:rPr>
-              <a:t>hacks.mozilla.org/category/code-cartoons/a-cartoon-intro-to-webassembly/</a:t>
+              <a:t>https://hacks.mozilla.org/category/code-cartoons/a-cartoon-intro-to-webassembly/</a:t>
             </a:r>
             <a:endParaRPr lang="en-US" sz="2000" dirty="0" smtClean="0">
               <a:solidFill>
@@ -7886,14 +7876,43 @@
               <a:t>: </a:t>
             </a:r>
             <a:r>
-              <a:rPr lang="en-US" sz="2000" dirty="0" smtClean="0">
+              <a:rPr lang="en-US" sz="2000" dirty="0">
                 <a:solidFill>
                   <a:schemeClr val="bg1"/>
                 </a:solidFill>
                 <a:latin typeface="Franklin Gothic Heavy" panose="020B0903020102020204" pitchFamily="34" charset="0"/>
                 <a:hlinkClick r:id="rId7"/>
               </a:rPr>
-              <a:t>https://github.com/Antonyo/CefSharp</a:t>
+              <a:t>https</a:t>
+            </a:r>
+            <a:r>
+              <a:rPr lang="en-US" sz="2000">
+                <a:solidFill>
+                  <a:schemeClr val="bg1"/>
+                </a:solidFill>
+                <a:latin typeface="Franklin Gothic Heavy" panose="020B0903020102020204" pitchFamily="34" charset="0"/>
+                <a:hlinkClick r:id="rId7"/>
+              </a:rPr>
+              <a:t>://</a:t>
+            </a:r>
+            <a:r>
+              <a:rPr lang="en-US" sz="2000" smtClean="0">
+                <a:solidFill>
+                  <a:schemeClr val="bg1"/>
+                </a:solidFill>
+                <a:latin typeface="Franklin Gothic Heavy" panose="020B0903020102020204" pitchFamily="34" charset="0"/>
+                <a:hlinkClick r:id="rId7"/>
+              </a:rPr>
+              <a:t>github.com/Antonyo/DotNetMeetup</a:t>
+            </a:r>
+            <a:r>
+              <a:rPr lang="en-US" sz="2000" smtClean="0">
+                <a:solidFill>
+                  <a:schemeClr val="bg1"/>
+                </a:solidFill>
+                <a:latin typeface="Franklin Gothic Heavy" panose="020B0903020102020204" pitchFamily="34" charset="0"/>
+              </a:rPr>
+              <a:t>	</a:t>
             </a:r>
             <a:endParaRPr lang="en-US" sz="2000" dirty="0" smtClean="0">
               <a:solidFill>

</xml_diff>